<commit_message>
adding authors to presentation
</commit_message>
<xml_diff>
--- a/idemix-middlelayer-spec/presentation.pptx
+++ b/idemix-middlelayer-spec/presentation.pptx
@@ -216,7 +216,7 @@
           <a:p>
             <a:fld id="{2A726E87-E356-4255-9582-35C750C97DDB}" type="datetimeFigureOut">
               <a:rPr lang="en-US" smtClean="0"/>
-              <a:t>12/4/17</a:t>
+              <a:t>12/4/2017</a:t>
             </a:fld>
             <a:endParaRPr lang="en-US"/>
           </a:p>
@@ -786,7 +786,7 @@
           <a:p>
             <a:fld id="{31B4DB2A-C3B2-2745-A6A4-D7EA2FE0BCD3}" type="datetime1">
               <a:rPr lang="en-US" smtClean="0"/>
-              <a:t>12/4/17</a:t>
+              <a:t>12/4/2017</a:t>
             </a:fld>
             <a:endParaRPr lang="en-US"/>
           </a:p>
@@ -954,7 +954,7 @@
           <a:p>
             <a:fld id="{DF7E9E5E-91C2-5D41-9EED-0725024C08FF}" type="datetime1">
               <a:rPr lang="en-US" smtClean="0"/>
-              <a:t>12/4/17</a:t>
+              <a:t>12/4/2017</a:t>
             </a:fld>
             <a:endParaRPr lang="en-US"/>
           </a:p>
@@ -1132,7 +1132,7 @@
           <a:p>
             <a:fld id="{F8A23662-8B33-474A-807E-DFB6B12DB521}" type="datetime1">
               <a:rPr lang="en-US" smtClean="0"/>
-              <a:t>12/4/17</a:t>
+              <a:t>12/4/2017</a:t>
             </a:fld>
             <a:endParaRPr lang="en-US"/>
           </a:p>
@@ -1300,7 +1300,7 @@
           <a:p>
             <a:fld id="{7BE2E3D1-AE47-EA47-B9A1-AECA43EEA104}" type="datetime1">
               <a:rPr lang="en-US" smtClean="0"/>
-              <a:t>12/4/17</a:t>
+              <a:t>12/4/2017</a:t>
             </a:fld>
             <a:endParaRPr lang="en-US"/>
           </a:p>
@@ -1545,7 +1545,7 @@
           <a:p>
             <a:fld id="{3CA09F2D-355C-974F-8E2C-F6004F791B14}" type="datetime1">
               <a:rPr lang="en-US" smtClean="0"/>
-              <a:t>12/4/17</a:t>
+              <a:t>12/4/2017</a:t>
             </a:fld>
             <a:endParaRPr lang="en-US"/>
           </a:p>
@@ -1774,7 +1774,7 @@
           <a:p>
             <a:fld id="{4BE71B72-0395-974B-887A-D7B90138E4D2}" type="datetime1">
               <a:rPr lang="en-US" smtClean="0"/>
-              <a:t>12/4/17</a:t>
+              <a:t>12/4/2017</a:t>
             </a:fld>
             <a:endParaRPr lang="en-US"/>
           </a:p>
@@ -2138,7 +2138,7 @@
           <a:p>
             <a:fld id="{E6008377-E847-F04B-8922-3E1A4647E805}" type="datetime1">
               <a:rPr lang="en-US" smtClean="0"/>
-              <a:t>12/4/17</a:t>
+              <a:t>12/4/2017</a:t>
             </a:fld>
             <a:endParaRPr lang="en-US"/>
           </a:p>
@@ -2255,7 +2255,7 @@
           <a:p>
             <a:fld id="{1C4330FD-FE64-6A4C-A317-957D4215A5CC}" type="datetime1">
               <a:rPr lang="en-US" smtClean="0"/>
-              <a:t>12/4/17</a:t>
+              <a:t>12/4/2017</a:t>
             </a:fld>
             <a:endParaRPr lang="en-US"/>
           </a:p>
@@ -2350,7 +2350,7 @@
           <a:p>
             <a:fld id="{99190C97-E2C9-7E4D-BF71-DE0E9ACE5EBF}" type="datetime1">
               <a:rPr lang="en-US" smtClean="0"/>
-              <a:t>12/4/17</a:t>
+              <a:t>12/4/2017</a:t>
             </a:fld>
             <a:endParaRPr lang="en-US"/>
           </a:p>
@@ -2625,7 +2625,7 @@
           <a:p>
             <a:fld id="{7CB0EED0-10BF-6B4F-9A29-D42BDB785B8F}" type="datetime1">
               <a:rPr lang="en-US" smtClean="0"/>
-              <a:t>12/4/17</a:t>
+              <a:t>12/4/2017</a:t>
             </a:fld>
             <a:endParaRPr lang="en-US"/>
           </a:p>
@@ -2877,7 +2877,7 @@
           <a:p>
             <a:fld id="{E3935C14-3763-D842-A04F-403F636D1A34}" type="datetime1">
               <a:rPr lang="en-US" smtClean="0"/>
-              <a:t>12/4/17</a:t>
+              <a:t>12/4/2017</a:t>
             </a:fld>
             <a:endParaRPr lang="en-US"/>
           </a:p>
@@ -3088,7 +3088,7 @@
           <a:p>
             <a:fld id="{4BBFEECD-D9A9-6444-AFBD-3180F6C55CFF}" type="datetime1">
               <a:rPr lang="en-US" smtClean="0"/>
-              <a:t>12/4/17</a:t>
+              <a:t>12/4/2017</a:t>
             </a:fld>
             <a:endParaRPr lang="en-US"/>
           </a:p>
@@ -3536,9 +3536,16 @@
             <p:ph type="subTitle" idx="1"/>
           </p:nvPr>
         </p:nvSpPr>
-        <p:spPr/>
-        <p:txBody>
-          <a:bodyPr/>
+        <p:spPr>
+          <a:xfrm>
+            <a:off x="1524000" y="3602038"/>
+            <a:ext cx="9144000" cy="2387600"/>
+          </a:xfrm>
+        </p:spPr>
+        <p:txBody>
+          <a:bodyPr>
+            <a:normAutofit/>
+          </a:bodyPr>
           <a:lstStyle/>
           <a:p>
             <a:r>
@@ -3566,16 +3573,18 @@
               <a:t>Dubovitskaya</a:t>
             </a:r>
             <a:r>
-              <a:rPr lang="en-US" dirty="0"/>
-              <a:t>,</a:t>
-            </a:r>
-            <a:r>
               <a:rPr lang="en-US" baseline="30000" dirty="0"/>
               <a:t> 1</a:t>
             </a:r>
             <a:r>
               <a:rPr lang="en-US" dirty="0"/>
-              <a:t> Jason Law</a:t>
+              <a:t>, </a:t>
+            </a:r>
+          </a:p>
+          <a:p>
+            <a:r>
+              <a:rPr lang="en-US" dirty="0"/>
+              <a:t>Nathan George</a:t>
             </a:r>
             <a:r>
               <a:rPr lang="en-US" baseline="30000" dirty="0"/>
@@ -3583,19 +3592,53 @@
             </a:r>
             <a:r>
               <a:rPr lang="en-US" dirty="0"/>
-              <a:t>, ... </a:t>
-            </a:r>
-          </a:p>
-          <a:p>
+              <a:t>, </a:t>
+            </a:r>
+            <a:r>
+              <a:rPr lang="en-US" dirty="0" err="1"/>
+              <a:t>Lovesh</a:t>
+            </a:r>
             <a:r>
               <a:rPr lang="en-US" dirty="0"/>
-              <a:t>1: IBM Research – Zurich</a:t>
-            </a:r>
-          </a:p>
-          <a:p>
+              <a:t> Harchandani</a:t>
+            </a:r>
+            <a:r>
+              <a:rPr lang="en-US" baseline="30000" dirty="0"/>
+              <a:t>2</a:t>
+            </a:r>
             <a:r>
               <a:rPr lang="en-US" dirty="0"/>
-              <a:t>2: </a:t>
+              <a:t>, Jason Law</a:t>
+            </a:r>
+            <a:r>
+              <a:rPr lang="en-US" baseline="30000" dirty="0"/>
+              <a:t>2</a:t>
+            </a:r>
+          </a:p>
+          <a:p>
+            <a:r>
+              <a:rPr lang="en-US" dirty="0"/>
+              <a:t> </a:t>
+            </a:r>
+          </a:p>
+          <a:p>
+            <a:r>
+              <a:rPr lang="en-US" baseline="30000" dirty="0"/>
+              <a:t>1</a:t>
+            </a:r>
+            <a:r>
+              <a:rPr lang="en-US" dirty="0"/>
+              <a:t> IBM Research – Zurich</a:t>
+            </a:r>
+          </a:p>
+          <a:p>
+            <a:r>
+              <a:rPr lang="en-US" baseline="30000" dirty="0"/>
+              <a:t>2</a:t>
+            </a:r>
+            <a:r>
+              <a:rPr lang="en-US" dirty="0"/>
+              <a:t> </a:t>
             </a:r>
             <a:r>
               <a:rPr lang="en-US" dirty="0" err="1"/>
@@ -4416,15 +4459,7 @@
           <a:p>
             <a:r>
               <a:rPr lang="en-US" dirty="0"/>
-              <a:t>- prove possession of a credential with four attributes issued by </a:t>
-            </a:r>
-            <a:r>
-              <a:rPr lang="en-US" dirty="0" smtClean="0"/>
-              <a:t>an </a:t>
-            </a:r>
-            <a:r>
-              <a:rPr lang="en-US" dirty="0"/>
-              <a:t>issuer with </a:t>
+              <a:t>- prove possession of a credential with four attributes issued by an issuer with </a:t>
             </a:r>
             <a:r>
               <a:rPr lang="en-US" dirty="0" err="1"/>
@@ -5424,13 +5459,8 @@
           <a:p>
             <a:r>
               <a:rPr lang="en-US" dirty="0"/>
-              <a:t>An effort for standardizing protocols and languages for authentication and identity </a:t>
-            </a:r>
-            <a:r>
-              <a:rPr lang="en-US" dirty="0" smtClean="0"/>
-              <a:t>management</a:t>
-            </a:r>
-            <a:endParaRPr lang="en-US" dirty="0"/>
+              <a:t>An effort for standardizing protocols and languages for authentication and identity management</a:t>
+            </a:r>
           </a:p>
           <a:p>
             <a:r>
@@ -5444,72 +5474,35 @@
           <a:p>
             <a:r>
               <a:rPr lang="en-US" dirty="0"/>
-              <a:t>A holder collects </a:t>
-            </a:r>
-            <a:r>
-              <a:rPr lang="en-US" dirty="0" smtClean="0"/>
-              <a:t>credentials from </a:t>
-            </a:r>
-            <a:r>
-              <a:rPr lang="en-US" dirty="0"/>
-              <a:t>different issuers </a:t>
-            </a:r>
-            <a:endParaRPr lang="en-US" dirty="0"/>
-          </a:p>
-          <a:p>
-            <a:r>
-              <a:rPr lang="en-US" dirty="0" smtClean="0">
-                <a:solidFill>
-                  <a:srgbClr val="000000"/>
-                </a:solidFill>
-              </a:rPr>
-              <a:t>A </a:t>
-            </a:r>
+              <a:t>A holder collects credentials from different issuers </a:t>
+            </a:r>
+          </a:p>
+          <a:p>
             <a:r>
               <a:rPr lang="en-US" dirty="0">
                 <a:solidFill>
                   <a:srgbClr val="000000"/>
                 </a:solidFill>
               </a:rPr>
-              <a:t>verifiable credential reveals multiple claims about the holder</a:t>
+              <a:t>A verifiable credential reveals multiple claims about the holder</a:t>
             </a:r>
             <a:r>
               <a:rPr lang="en-US" dirty="0"/>
-              <a:t> </a:t>
-            </a:r>
-            <a:r>
-              <a:rPr lang="en-US" dirty="0" smtClean="0"/>
-              <a:t>to </a:t>
-            </a:r>
+              <a:t> to service providers</a:t>
+            </a:r>
+          </a:p>
+          <a:p>
             <a:r>
               <a:rPr lang="en-US" dirty="0"/>
-              <a:t>service providers</a:t>
-            </a:r>
-          </a:p>
-          <a:p>
+              <a:t>A claim </a:t>
+            </a:r>
+            <a:r>
+              <a:rPr lang="en-US"/>
+              <a:t>can reveal different </a:t>
+            </a:r>
             <a:r>
               <a:rPr lang="en-US" dirty="0"/>
-              <a:t>A </a:t>
-            </a:r>
-            <a:r>
-              <a:rPr lang="en-US" dirty="0" smtClean="0"/>
-              <a:t>claim </a:t>
-            </a:r>
-            <a:r>
-              <a:rPr lang="en-US"/>
-              <a:t>can </a:t>
-            </a:r>
-            <a:r>
-              <a:rPr lang="en-US" smtClean="0"/>
-              <a:t>reveal different </a:t>
-            </a:r>
-            <a:r>
-              <a:rPr lang="en-US" dirty="0" smtClean="0"/>
-              <a:t>attributes </a:t>
-            </a:r>
-            <a:r>
-              <a:rPr lang="en-US" dirty="0"/>
-              <a:t>(e.g., email address) or just facts (e.g., Older18) about the holder</a:t>
+              <a:t>attributes (e.g., email address) or just facts (e.g., Older18) about the holder</a:t>
             </a:r>
           </a:p>
           <a:p>
@@ -5581,7 +5574,7 @@
           <p:cNvPr id="10" name="Graphic 9">
             <a:extLst>
               <a:ext uri="{FF2B5EF4-FFF2-40B4-BE49-F238E27FC236}">
-                <a16:creationId xmlns:a16="http://schemas.microsoft.com/office/drawing/2014/main" xmlns="" id="{54D0BBE4-CA03-48E5-8310-06A26157DB04}"/>
+                <a16:creationId xmlns:a16="http://schemas.microsoft.com/office/drawing/2014/main" id="{54D0BBE4-CA03-48E5-8310-06A26157DB04}"/>
               </a:ext>
             </a:extLst>
           </p:cNvPr>
@@ -5594,7 +5587,7 @@
           <a:blip r:embed="rId2">
             <a:extLst>
               <a:ext uri="{96DAC541-7B7A-43D3-8B79-37D633B846F1}">
-                <asvg:svgBlip xmlns:asvg="http://schemas.microsoft.com/office/drawing/2016/SVG/main" xmlns="" r:embed="rId3"/>
+                <asvg:svgBlip xmlns:asvg="http://schemas.microsoft.com/office/drawing/2016/SVG/main" r:embed="rId3"/>
               </a:ext>
             </a:extLst>
           </a:blip>
@@ -5747,7 +5740,7 @@
           <p:cNvPr id="12" name="Content Placeholder 11">
             <a:extLst>
               <a:ext uri="{FF2B5EF4-FFF2-40B4-BE49-F238E27FC236}">
-                <a16:creationId xmlns:a16="http://schemas.microsoft.com/office/drawing/2014/main" xmlns="" id="{18BDD4EB-0324-4517-9CDE-41869385A00F}"/>
+                <a16:creationId xmlns:a16="http://schemas.microsoft.com/office/drawing/2014/main" id="{18BDD4EB-0324-4517-9CDE-41869385A00F}"/>
               </a:ext>
             </a:extLst>
           </p:cNvPr>
@@ -5811,7 +5804,7 @@
           <p:cNvPr id="13" name="Content Placeholder 10">
             <a:extLst>
               <a:ext uri="{FF2B5EF4-FFF2-40B4-BE49-F238E27FC236}">
-                <a16:creationId xmlns:a16="http://schemas.microsoft.com/office/drawing/2014/main" xmlns="" id="{034C4EE4-849C-419F-9DB2-A7A79B726878}"/>
+                <a16:creationId xmlns:a16="http://schemas.microsoft.com/office/drawing/2014/main" id="{034C4EE4-849C-419F-9DB2-A7A79B726878}"/>
               </a:ext>
             </a:extLst>
           </p:cNvPr>
@@ -5824,7 +5817,7 @@
           <a:blip r:embed="rId2">
             <a:extLst>
               <a:ext uri="{96DAC541-7B7A-43D3-8B79-37D633B846F1}">
-                <asvg:svgBlip xmlns:asvg="http://schemas.microsoft.com/office/drawing/2016/SVG/main" xmlns="" r:embed="rId3"/>
+                <asvg:svgBlip xmlns:asvg="http://schemas.microsoft.com/office/drawing/2016/SVG/main" r:embed="rId3"/>
               </a:ext>
             </a:extLst>
           </a:blip>
@@ -5847,7 +5840,7 @@
           <p:cNvPr id="15" name="Graphic 14">
             <a:extLst>
               <a:ext uri="{FF2B5EF4-FFF2-40B4-BE49-F238E27FC236}">
-                <a16:creationId xmlns:a16="http://schemas.microsoft.com/office/drawing/2014/main" xmlns="" id="{0E397782-4645-4E08-B409-BDFEF7CB322A}"/>
+                <a16:creationId xmlns:a16="http://schemas.microsoft.com/office/drawing/2014/main" id="{0E397782-4645-4E08-B409-BDFEF7CB322A}"/>
               </a:ext>
             </a:extLst>
           </p:cNvPr>
@@ -5860,7 +5853,7 @@
           <a:blip r:embed="rId4">
             <a:extLst>
               <a:ext uri="{96DAC541-7B7A-43D3-8B79-37D633B846F1}">
-                <asvg:svgBlip xmlns:asvg="http://schemas.microsoft.com/office/drawing/2016/SVG/main" xmlns="" r:embed="rId5"/>
+                <asvg:svgBlip xmlns:asvg="http://schemas.microsoft.com/office/drawing/2016/SVG/main" r:embed="rId5"/>
               </a:ext>
             </a:extLst>
           </a:blip>
@@ -5883,7 +5876,7 @@
           <p:cNvPr id="17" name="Graphic 16">
             <a:extLst>
               <a:ext uri="{FF2B5EF4-FFF2-40B4-BE49-F238E27FC236}">
-                <a16:creationId xmlns:a16="http://schemas.microsoft.com/office/drawing/2014/main" xmlns="" id="{4802D170-AF7E-42A8-B699-F5763887A3CC}"/>
+                <a16:creationId xmlns:a16="http://schemas.microsoft.com/office/drawing/2014/main" id="{4802D170-AF7E-42A8-B699-F5763887A3CC}"/>
               </a:ext>
             </a:extLst>
           </p:cNvPr>
@@ -5896,7 +5889,7 @@
           <a:blip r:embed="rId6">
             <a:extLst>
               <a:ext uri="{96DAC541-7B7A-43D3-8B79-37D633B846F1}">
-                <asvg:svgBlip xmlns:asvg="http://schemas.microsoft.com/office/drawing/2016/SVG/main" xmlns="" r:embed="rId7"/>
+                <asvg:svgBlip xmlns:asvg="http://schemas.microsoft.com/office/drawing/2016/SVG/main" r:embed="rId7"/>
               </a:ext>
             </a:extLst>
           </a:blip>
@@ -6137,7 +6130,7 @@
                       <m:dPr>
                         <m:ctrlPr>
                           <a:rPr lang="en-US" b="0" i="1" smtClean="0">
-                            <a:latin typeface="Cambria Math" charset="0"/>
+                            <a:latin typeface="Cambria Math" panose="02040503050406030204" pitchFamily="18" charset="0"/>
                           </a:rPr>
                         </m:ctrlPr>
                       </m:dPr>
@@ -6190,7 +6183,7 @@
                       <m:sSupPr>
                         <m:ctrlPr>
                           <a:rPr lang="en-US" b="0" i="1" smtClean="0">
-                            <a:latin typeface="Cambria Math" charset="0"/>
+                            <a:latin typeface="Cambria Math" panose="02040503050406030204" pitchFamily="18" charset="0"/>
                           </a:rPr>
                         </m:ctrlPr>
                       </m:sSupPr>
@@ -6222,7 +6215,7 @@
                       <m:sSupPr>
                         <m:ctrlPr>
                           <a:rPr lang="en-US" b="0" i="1" smtClean="0">
-                            <a:latin typeface="Cambria Math" charset="0"/>
+                            <a:latin typeface="Cambria Math" panose="02040503050406030204" pitchFamily="18" charset="0"/>
                             <a:ea typeface="Cambria Math" panose="02040503050406030204" pitchFamily="18" charset="0"/>
                           </a:rPr>
                         </m:ctrlPr>
@@ -6259,7 +6252,7 @@
                         <m:chr m:val="̅"/>
                         <m:ctrlPr>
                           <a:rPr lang="en-US" i="1" smtClean="0">
-                            <a:latin typeface="Cambria Math" charset="0"/>
+                            <a:latin typeface="Cambria Math" panose="02040503050406030204" pitchFamily="18" charset="0"/>
                           </a:rPr>
                         </m:ctrlPr>
                       </m:accPr>
@@ -6290,7 +6283,7 @@
                       <m:sSupPr>
                         <m:ctrlPr>
                           <a:rPr lang="en-US" b="0" i="1" smtClean="0">
-                            <a:latin typeface="Cambria Math" charset="0"/>
+                            <a:latin typeface="Cambria Math" panose="02040503050406030204" pitchFamily="18" charset="0"/>
                             <a:ea typeface="Cambria Math" panose="02040503050406030204" pitchFamily="18" charset="0"/>
                           </a:rPr>
                         </m:ctrlPr>
@@ -6339,7 +6332,7 @@
                       <m:sSupPr>
                         <m:ctrlPr>
                           <a:rPr lang="en-US" b="0" i="1" smtClean="0">
-                            <a:latin typeface="Cambria Math" charset="0"/>
+                            <a:latin typeface="Cambria Math" panose="02040503050406030204" pitchFamily="18" charset="0"/>
                             <a:ea typeface="Cambria Math" panose="02040503050406030204" pitchFamily="18" charset="0"/>
                           </a:rPr>
                         </m:ctrlPr>
@@ -6349,7 +6342,7 @@
                           <m:dPr>
                             <m:ctrlPr>
                               <a:rPr lang="en-US" i="1">
-                                <a:latin typeface="Cambria Math" charset="0"/>
+                                <a:latin typeface="Cambria Math" panose="02040503050406030204" pitchFamily="18" charset="0"/>
                                 <a:ea typeface="Cambria Math" panose="02040503050406030204" pitchFamily="18" charset="0"/>
                               </a:rPr>
                             </m:ctrlPr>
@@ -6359,7 +6352,7 @@
                               <m:sSubPr>
                                 <m:ctrlPr>
                                   <a:rPr lang="en-US" i="1">
-                                    <a:latin typeface="Cambria Math" charset="0"/>
+                                    <a:latin typeface="Cambria Math" panose="02040503050406030204" pitchFamily="18" charset="0"/>
                                     <a:ea typeface="Cambria Math" panose="02040503050406030204" pitchFamily="18" charset="0"/>
                                   </a:rPr>
                                 </m:ctrlPr>
@@ -6394,7 +6387,7 @@
                               <m:sSupPr>
                                 <m:ctrlPr>
                                   <a:rPr lang="en-US" i="1">
-                                    <a:latin typeface="Cambria Math" charset="0"/>
+                                    <a:latin typeface="Cambria Math" panose="02040503050406030204" pitchFamily="18" charset="0"/>
                                     <a:ea typeface="Cambria Math" panose="02040503050406030204" pitchFamily="18" charset="0"/>
                                   </a:rPr>
                                 </m:ctrlPr>
@@ -6404,7 +6397,7 @@
                                   <m:sSubPr>
                                     <m:ctrlPr>
                                       <a:rPr lang="en-US" i="1">
-                                        <a:latin typeface="Cambria Math" charset="0"/>
+                                        <a:latin typeface="Cambria Math" panose="02040503050406030204" pitchFamily="18" charset="0"/>
                                         <a:ea typeface="Cambria Math" panose="02040503050406030204" pitchFamily="18" charset="0"/>
                                       </a:rPr>
                                     </m:ctrlPr>
@@ -6450,7 +6443,7 @@
                               <m:sSupPr>
                                 <m:ctrlPr>
                                   <a:rPr lang="en-US" i="1">
-                                    <a:latin typeface="Cambria Math" charset="0"/>
+                                    <a:latin typeface="Cambria Math" panose="02040503050406030204" pitchFamily="18" charset="0"/>
                                     <a:ea typeface="Cambria Math" panose="02040503050406030204" pitchFamily="18" charset="0"/>
                                   </a:rPr>
                                 </m:ctrlPr>
@@ -6460,7 +6453,7 @@
                                   <m:sSubPr>
                                     <m:ctrlPr>
                                       <a:rPr lang="en-US" i="1">
-                                        <a:latin typeface="Cambria Math" charset="0"/>
+                                        <a:latin typeface="Cambria Math" panose="02040503050406030204" pitchFamily="18" charset="0"/>
                                         <a:ea typeface="Cambria Math" panose="02040503050406030204" pitchFamily="18" charset="0"/>
                                       </a:rPr>
                                     </m:ctrlPr>
@@ -6519,7 +6512,7 @@
                       <m:sSupPr>
                         <m:ctrlPr>
                           <a:rPr lang="en-US" b="0" i="1" smtClean="0">
-                            <a:latin typeface="Cambria Math" charset="0"/>
+                            <a:latin typeface="Cambria Math" panose="02040503050406030204" pitchFamily="18" charset="0"/>
                             <a:ea typeface="Cambria Math" panose="02040503050406030204" pitchFamily="18" charset="0"/>
                           </a:rPr>
                         </m:ctrlPr>
@@ -6529,7 +6522,7 @@
                           <m:sSupPr>
                             <m:ctrlPr>
                               <a:rPr lang="en-US" b="0" i="1" smtClean="0">
-                                <a:latin typeface="Cambria Math" charset="0"/>
+                                <a:latin typeface="Cambria Math" panose="02040503050406030204" pitchFamily="18" charset="0"/>
                                 <a:ea typeface="Cambria Math" panose="02040503050406030204" pitchFamily="18" charset="0"/>
                               </a:rPr>
                             </m:ctrlPr>
@@ -6596,7 +6589,7 @@
                       <m:sSupPr>
                         <m:ctrlPr>
                           <a:rPr lang="en-US" i="1">
-                            <a:latin typeface="Cambria Math" charset="0"/>
+                            <a:latin typeface="Cambria Math" panose="02040503050406030204" pitchFamily="18" charset="0"/>
                             <a:ea typeface="Cambria Math" panose="02040503050406030204" pitchFamily="18" charset="0"/>
                           </a:rPr>
                         </m:ctrlPr>
@@ -6606,7 +6599,7 @@
                           <m:dPr>
                             <m:ctrlPr>
                               <a:rPr lang="en-US" i="1">
-                                <a:latin typeface="Cambria Math" charset="0"/>
+                                <a:latin typeface="Cambria Math" panose="02040503050406030204" pitchFamily="18" charset="0"/>
                                 <a:ea typeface="Cambria Math" panose="02040503050406030204" pitchFamily="18" charset="0"/>
                               </a:rPr>
                             </m:ctrlPr>
@@ -6616,7 +6609,7 @@
                               <m:sSubPr>
                                 <m:ctrlPr>
                                   <a:rPr lang="en-US" i="1">
-                                    <a:latin typeface="Cambria Math" charset="0"/>
+                                    <a:latin typeface="Cambria Math" panose="02040503050406030204" pitchFamily="18" charset="0"/>
                                     <a:ea typeface="Cambria Math" panose="02040503050406030204" pitchFamily="18" charset="0"/>
                                   </a:rPr>
                                 </m:ctrlPr>
@@ -6651,7 +6644,7 @@
                               <m:sSupPr>
                                 <m:ctrlPr>
                                   <a:rPr lang="en-US" i="1">
-                                    <a:latin typeface="Cambria Math" charset="0"/>
+                                    <a:latin typeface="Cambria Math" panose="02040503050406030204" pitchFamily="18" charset="0"/>
                                     <a:ea typeface="Cambria Math" panose="02040503050406030204" pitchFamily="18" charset="0"/>
                                   </a:rPr>
                                 </m:ctrlPr>
@@ -6661,7 +6654,7 @@
                                   <m:sSubPr>
                                     <m:ctrlPr>
                                       <a:rPr lang="en-US" i="1">
-                                        <a:latin typeface="Cambria Math" charset="0"/>
+                                        <a:latin typeface="Cambria Math" panose="02040503050406030204" pitchFamily="18" charset="0"/>
                                         <a:ea typeface="Cambria Math" panose="02040503050406030204" pitchFamily="18" charset="0"/>
                                       </a:rPr>
                                     </m:ctrlPr>
@@ -6707,7 +6700,7 @@
                               <m:sSupPr>
                                 <m:ctrlPr>
                                   <a:rPr lang="en-US" i="1">
-                                    <a:latin typeface="Cambria Math" charset="0"/>
+                                    <a:latin typeface="Cambria Math" panose="02040503050406030204" pitchFamily="18" charset="0"/>
                                     <a:ea typeface="Cambria Math" panose="02040503050406030204" pitchFamily="18" charset="0"/>
                                   </a:rPr>
                                 </m:ctrlPr>
@@ -6717,7 +6710,7 @@
                                   <m:sSubPr>
                                     <m:ctrlPr>
                                       <a:rPr lang="en-US" i="1">
-                                        <a:latin typeface="Cambria Math" charset="0"/>
+                                        <a:latin typeface="Cambria Math" panose="02040503050406030204" pitchFamily="18" charset="0"/>
                                         <a:ea typeface="Cambria Math" panose="02040503050406030204" pitchFamily="18" charset="0"/>
                                       </a:rPr>
                                     </m:ctrlPr>
@@ -6776,7 +6769,7 @@
                       <m:sSupPr>
                         <m:ctrlPr>
                           <a:rPr lang="en-US" i="1" smtClean="0">
-                            <a:latin typeface="Cambria Math" charset="0"/>
+                            <a:latin typeface="Cambria Math" panose="02040503050406030204" pitchFamily="18" charset="0"/>
                             <a:ea typeface="Cambria Math" panose="02040503050406030204" pitchFamily="18" charset="0"/>
                           </a:rPr>
                         </m:ctrlPr>
@@ -6786,7 +6779,7 @@
                           <m:sSubPr>
                             <m:ctrlPr>
                               <a:rPr lang="en-US" i="1" smtClean="0">
-                                <a:latin typeface="Cambria Math" charset="0"/>
+                                <a:latin typeface="Cambria Math" panose="02040503050406030204" pitchFamily="18" charset="0"/>
                                 <a:ea typeface="Cambria Math" panose="02040503050406030204" pitchFamily="18" charset="0"/>
                               </a:rPr>
                             </m:ctrlPr>
@@ -6858,7 +6851,7 @@
                           <m:endChr m:val="}"/>
                           <m:ctrlPr>
                             <a:rPr lang="en-US" sz="2667" i="1">
-                              <a:latin typeface="Cambria Math" charset="0"/>
+                              <a:latin typeface="Cambria Math" panose="02040503050406030204" pitchFamily="18" charset="0"/>
                             </a:rPr>
                           </m:ctrlPr>
                         </m:dPr>
@@ -6867,7 +6860,7 @@
                             <m:dPr>
                               <m:ctrlPr>
                                 <a:rPr lang="en-US" sz="2667" i="1">
-                                  <a:latin typeface="Cambria Math" charset="0"/>
+                                  <a:latin typeface="Cambria Math" panose="02040503050406030204" pitchFamily="18" charset="0"/>
                                 </a:rPr>
                               </m:ctrlPr>
                             </m:dPr>
@@ -6900,7 +6893,7 @@
                                 <m:sSupPr>
                                   <m:ctrlPr>
                                     <a:rPr lang="en-US" sz="2667" i="1">
-                                      <a:latin typeface="Cambria Math" charset="0"/>
+                                      <a:latin typeface="Cambria Math" panose="02040503050406030204" pitchFamily="18" charset="0"/>
                                     </a:rPr>
                                   </m:ctrlPr>
                                 </m:sSupPr>
@@ -6943,7 +6936,7 @@
                                 <m:sSupPr>
                                   <m:ctrlPr>
                                     <a:rPr lang="en-US" sz="2667" i="1">
-                                      <a:latin typeface="Cambria Math" charset="0"/>
+                                      <a:latin typeface="Cambria Math" panose="02040503050406030204" pitchFamily="18" charset="0"/>
                                     </a:rPr>
                                   </m:ctrlPr>
                                 </m:sSupPr>
@@ -6974,7 +6967,7 @@
                                 <m:sSupPr>
                                   <m:ctrlPr>
                                     <a:rPr lang="en-US" sz="2667" i="1">
-                                      <a:latin typeface="Cambria Math" charset="0"/>
+                                      <a:latin typeface="Cambria Math" panose="02040503050406030204" pitchFamily="18" charset="0"/>
                                     </a:rPr>
                                   </m:ctrlPr>
                                 </m:sSupPr>
@@ -7007,7 +7000,7 @@
                             <m:fPr>
                               <m:ctrlPr>
                                 <a:rPr lang="en-US" sz="2667" i="1">
-                                  <a:latin typeface="Cambria Math" charset="0"/>
+                                  <a:latin typeface="Cambria Math" panose="02040503050406030204" pitchFamily="18" charset="0"/>
                                 </a:rPr>
                               </m:ctrlPr>
                             </m:fPr>
@@ -7017,7 +7010,7 @@
                                   <m:chr m:val="̅"/>
                                   <m:ctrlPr>
                                     <a:rPr lang="en-US" sz="2667" i="1">
-                                      <a:latin typeface="Cambria Math" charset="0"/>
+                                      <a:latin typeface="Cambria Math" panose="02040503050406030204" pitchFamily="18" charset="0"/>
                                     </a:rPr>
                                   </m:ctrlPr>
                                 </m:accPr>
@@ -7050,7 +7043,7 @@
                             <m:sSupPr>
                               <m:ctrlPr>
                                 <a:rPr lang="en-US" sz="2667" i="1">
-                                  <a:latin typeface="Cambria Math" charset="0"/>
+                                  <a:latin typeface="Cambria Math" panose="02040503050406030204" pitchFamily="18" charset="0"/>
                                   <a:ea typeface="Cambria Math" panose="02040503050406030204" pitchFamily="18" charset="0"/>
                                 </a:rPr>
                               </m:ctrlPr>
@@ -7092,7 +7085,7 @@
                             <m:sSupPr>
                               <m:ctrlPr>
                                 <a:rPr lang="en-US" sz="2667" i="1">
-                                  <a:latin typeface="Cambria Math" charset="0"/>
+                                  <a:latin typeface="Cambria Math" panose="02040503050406030204" pitchFamily="18" charset="0"/>
                                   <a:ea typeface="Cambria Math" panose="02040503050406030204" pitchFamily="18" charset="0"/>
                                 </a:rPr>
                               </m:ctrlPr>
@@ -7109,7 +7102,7 @@
                                 <m:sSubPr>
                                   <m:ctrlPr>
                                     <a:rPr lang="en-US" sz="2667" i="1">
-                                      <a:latin typeface="Cambria Math" charset="0"/>
+                                      <a:latin typeface="Cambria Math" panose="02040503050406030204" pitchFamily="18" charset="0"/>
                                       <a:ea typeface="Cambria Math" panose="02040503050406030204" pitchFamily="18" charset="0"/>
                                     </a:rPr>
                                   </m:ctrlPr>
@@ -7162,7 +7155,7 @@
                             <m:sSubPr>
                               <m:ctrlPr>
                                 <a:rPr lang="en-US" sz="2667" i="1">
-                                  <a:latin typeface="Cambria Math" charset="0"/>
+                                  <a:latin typeface="Cambria Math" panose="02040503050406030204" pitchFamily="18" charset="0"/>
                                   <a:ea typeface="Cambria Math" panose="02040503050406030204" pitchFamily="18" charset="0"/>
                                 </a:rPr>
                               </m:ctrlPr>
@@ -7197,7 +7190,7 @@
                             <m:sSupPr>
                               <m:ctrlPr>
                                 <a:rPr lang="en-US" sz="2667" i="1">
-                                  <a:latin typeface="Cambria Math" charset="0"/>
+                                  <a:latin typeface="Cambria Math" panose="02040503050406030204" pitchFamily="18" charset="0"/>
                                   <a:ea typeface="Cambria Math" panose="02040503050406030204" pitchFamily="18" charset="0"/>
                                 </a:rPr>
                               </m:ctrlPr>
@@ -7239,7 +7232,7 @@
                             <m:sSubSupPr>
                               <m:ctrlPr>
                                 <a:rPr lang="en-US" sz="2667" i="1">
-                                  <a:latin typeface="Cambria Math" charset="0"/>
+                                  <a:latin typeface="Cambria Math" panose="02040503050406030204" pitchFamily="18" charset="0"/>
                                   <a:ea typeface="Cambria Math" panose="02040503050406030204" pitchFamily="18" charset="0"/>
                                 </a:rPr>
                               </m:ctrlPr>
@@ -7274,7 +7267,7 @@
                                 <m:sSupPr>
                                   <m:ctrlPr>
                                     <a:rPr lang="en-US" sz="2667" i="1">
-                                      <a:latin typeface="Cambria Math" charset="0"/>
+                                      <a:latin typeface="Cambria Math" panose="02040503050406030204" pitchFamily="18" charset="0"/>
                                       <a:ea typeface="Cambria Math" panose="02040503050406030204" pitchFamily="18" charset="0"/>
                                     </a:rPr>
                                   </m:ctrlPr>
@@ -7311,7 +7304,7 @@
                             <m:sSubSupPr>
                               <m:ctrlPr>
                                 <a:rPr lang="en-US" sz="2667" i="1">
-                                  <a:latin typeface="Cambria Math" charset="0"/>
+                                  <a:latin typeface="Cambria Math" panose="02040503050406030204" pitchFamily="18" charset="0"/>
                                   <a:ea typeface="Cambria Math" panose="02040503050406030204" pitchFamily="18" charset="0"/>
                                 </a:rPr>
                               </m:ctrlPr>
@@ -7568,7 +7561,7 @@
                       <m:dPr>
                         <m:ctrlPr>
                           <a:rPr lang="en-US" b="0" i="1" smtClean="0">
-                            <a:latin typeface="Cambria Math" charset="0"/>
+                            <a:latin typeface="Cambria Math" panose="02040503050406030204" pitchFamily="18" charset="0"/>
                           </a:rPr>
                         </m:ctrlPr>
                       </m:dPr>
@@ -7621,7 +7614,7 @@
                       <m:sSupPr>
                         <m:ctrlPr>
                           <a:rPr lang="en-US" b="0" i="1" smtClean="0">
-                            <a:latin typeface="Cambria Math" charset="0"/>
+                            <a:latin typeface="Cambria Math" panose="02040503050406030204" pitchFamily="18" charset="0"/>
                           </a:rPr>
                         </m:ctrlPr>
                       </m:sSupPr>
@@ -7653,7 +7646,7 @@
                       <m:sSupPr>
                         <m:ctrlPr>
                           <a:rPr lang="en-US" b="0" i="1" smtClean="0">
-                            <a:latin typeface="Cambria Math" charset="0"/>
+                            <a:latin typeface="Cambria Math" panose="02040503050406030204" pitchFamily="18" charset="0"/>
                             <a:ea typeface="Cambria Math" panose="02040503050406030204" pitchFamily="18" charset="0"/>
                           </a:rPr>
                         </m:ctrlPr>
@@ -7690,7 +7683,7 @@
                         <m:chr m:val="̅"/>
                         <m:ctrlPr>
                           <a:rPr lang="en-US" i="1" smtClean="0">
-                            <a:latin typeface="Cambria Math" charset="0"/>
+                            <a:latin typeface="Cambria Math" panose="02040503050406030204" pitchFamily="18" charset="0"/>
                           </a:rPr>
                         </m:ctrlPr>
                       </m:accPr>
@@ -7721,7 +7714,7 @@
                       <m:sSupPr>
                         <m:ctrlPr>
                           <a:rPr lang="en-US" b="0" i="1" smtClean="0">
-                            <a:latin typeface="Cambria Math" charset="0"/>
+                            <a:latin typeface="Cambria Math" panose="02040503050406030204" pitchFamily="18" charset="0"/>
                             <a:ea typeface="Cambria Math" panose="02040503050406030204" pitchFamily="18" charset="0"/>
                           </a:rPr>
                         </m:ctrlPr>
@@ -7770,7 +7763,7 @@
                       <m:sSupPr>
                         <m:ctrlPr>
                           <a:rPr lang="en-US" b="0" i="1" smtClean="0">
-                            <a:latin typeface="Cambria Math" charset="0"/>
+                            <a:latin typeface="Cambria Math" panose="02040503050406030204" pitchFamily="18" charset="0"/>
                             <a:ea typeface="Cambria Math" panose="02040503050406030204" pitchFamily="18" charset="0"/>
                           </a:rPr>
                         </m:ctrlPr>
@@ -7780,7 +7773,7 @@
                           <m:dPr>
                             <m:ctrlPr>
                               <a:rPr lang="en-US" i="1">
-                                <a:latin typeface="Cambria Math" charset="0"/>
+                                <a:latin typeface="Cambria Math" panose="02040503050406030204" pitchFamily="18" charset="0"/>
                                 <a:ea typeface="Cambria Math" panose="02040503050406030204" pitchFamily="18" charset="0"/>
                               </a:rPr>
                             </m:ctrlPr>
@@ -7790,7 +7783,7 @@
                               <m:sSubPr>
                                 <m:ctrlPr>
                                   <a:rPr lang="en-US" i="1">
-                                    <a:latin typeface="Cambria Math" charset="0"/>
+                                    <a:latin typeface="Cambria Math" panose="02040503050406030204" pitchFamily="18" charset="0"/>
                                     <a:ea typeface="Cambria Math" panose="02040503050406030204" pitchFamily="18" charset="0"/>
                                   </a:rPr>
                                 </m:ctrlPr>
@@ -7825,7 +7818,7 @@
                               <m:sSupPr>
                                 <m:ctrlPr>
                                   <a:rPr lang="en-US" i="1">
-                                    <a:latin typeface="Cambria Math" charset="0"/>
+                                    <a:latin typeface="Cambria Math" panose="02040503050406030204" pitchFamily="18" charset="0"/>
                                     <a:ea typeface="Cambria Math" panose="02040503050406030204" pitchFamily="18" charset="0"/>
                                   </a:rPr>
                                 </m:ctrlPr>
@@ -7835,7 +7828,7 @@
                                   <m:sSubPr>
                                     <m:ctrlPr>
                                       <a:rPr lang="en-US" i="1">
-                                        <a:latin typeface="Cambria Math" charset="0"/>
+                                        <a:latin typeface="Cambria Math" panose="02040503050406030204" pitchFamily="18" charset="0"/>
                                         <a:ea typeface="Cambria Math" panose="02040503050406030204" pitchFamily="18" charset="0"/>
                                       </a:rPr>
                                     </m:ctrlPr>
@@ -7881,7 +7874,7 @@
                               <m:sSupPr>
                                 <m:ctrlPr>
                                   <a:rPr lang="en-US" i="1">
-                                    <a:latin typeface="Cambria Math" charset="0"/>
+                                    <a:latin typeface="Cambria Math" panose="02040503050406030204" pitchFamily="18" charset="0"/>
                                     <a:ea typeface="Cambria Math" panose="02040503050406030204" pitchFamily="18" charset="0"/>
                                   </a:rPr>
                                 </m:ctrlPr>
@@ -7891,7 +7884,7 @@
                                   <m:sSubPr>
                                     <m:ctrlPr>
                                       <a:rPr lang="en-US" i="1">
-                                        <a:latin typeface="Cambria Math" charset="0"/>
+                                        <a:latin typeface="Cambria Math" panose="02040503050406030204" pitchFamily="18" charset="0"/>
                                         <a:ea typeface="Cambria Math" panose="02040503050406030204" pitchFamily="18" charset="0"/>
                                       </a:rPr>
                                     </m:ctrlPr>
@@ -7950,7 +7943,7 @@
                       <m:sSupPr>
                         <m:ctrlPr>
                           <a:rPr lang="en-US" b="0" i="1" smtClean="0">
-                            <a:latin typeface="Cambria Math" charset="0"/>
+                            <a:latin typeface="Cambria Math" panose="02040503050406030204" pitchFamily="18" charset="0"/>
                             <a:ea typeface="Cambria Math" panose="02040503050406030204" pitchFamily="18" charset="0"/>
                           </a:rPr>
                         </m:ctrlPr>
@@ -7960,7 +7953,7 @@
                           <m:sSupPr>
                             <m:ctrlPr>
                               <a:rPr lang="en-US" b="0" i="1" smtClean="0">
-                                <a:latin typeface="Cambria Math" charset="0"/>
+                                <a:latin typeface="Cambria Math" panose="02040503050406030204" pitchFamily="18" charset="0"/>
                                 <a:ea typeface="Cambria Math" panose="02040503050406030204" pitchFamily="18" charset="0"/>
                               </a:rPr>
                             </m:ctrlPr>
@@ -8027,7 +8020,7 @@
                       <m:sSupPr>
                         <m:ctrlPr>
                           <a:rPr lang="en-US" i="1">
-                            <a:latin typeface="Cambria Math" charset="0"/>
+                            <a:latin typeface="Cambria Math" panose="02040503050406030204" pitchFamily="18" charset="0"/>
                             <a:ea typeface="Cambria Math" panose="02040503050406030204" pitchFamily="18" charset="0"/>
                           </a:rPr>
                         </m:ctrlPr>
@@ -8037,7 +8030,7 @@
                           <m:dPr>
                             <m:ctrlPr>
                               <a:rPr lang="en-US" i="1">
-                                <a:latin typeface="Cambria Math" charset="0"/>
+                                <a:latin typeface="Cambria Math" panose="02040503050406030204" pitchFamily="18" charset="0"/>
                                 <a:ea typeface="Cambria Math" panose="02040503050406030204" pitchFamily="18" charset="0"/>
                               </a:rPr>
                             </m:ctrlPr>
@@ -8047,7 +8040,7 @@
                               <m:sSubPr>
                                 <m:ctrlPr>
                                   <a:rPr lang="en-US" i="1">
-                                    <a:latin typeface="Cambria Math" charset="0"/>
+                                    <a:latin typeface="Cambria Math" panose="02040503050406030204" pitchFamily="18" charset="0"/>
                                     <a:ea typeface="Cambria Math" panose="02040503050406030204" pitchFamily="18" charset="0"/>
                                   </a:rPr>
                                 </m:ctrlPr>
@@ -8082,7 +8075,7 @@
                               <m:sSupPr>
                                 <m:ctrlPr>
                                   <a:rPr lang="en-US" i="1">
-                                    <a:latin typeface="Cambria Math" charset="0"/>
+                                    <a:latin typeface="Cambria Math" panose="02040503050406030204" pitchFamily="18" charset="0"/>
                                     <a:ea typeface="Cambria Math" panose="02040503050406030204" pitchFamily="18" charset="0"/>
                                   </a:rPr>
                                 </m:ctrlPr>
@@ -8092,7 +8085,7 @@
                                   <m:sSubPr>
                                     <m:ctrlPr>
                                       <a:rPr lang="en-US" i="1">
-                                        <a:latin typeface="Cambria Math" charset="0"/>
+                                        <a:latin typeface="Cambria Math" panose="02040503050406030204" pitchFamily="18" charset="0"/>
                                         <a:ea typeface="Cambria Math" panose="02040503050406030204" pitchFamily="18" charset="0"/>
                                       </a:rPr>
                                     </m:ctrlPr>
@@ -8138,7 +8131,7 @@
                               <m:sSupPr>
                                 <m:ctrlPr>
                                   <a:rPr lang="en-US" i="1">
-                                    <a:latin typeface="Cambria Math" charset="0"/>
+                                    <a:latin typeface="Cambria Math" panose="02040503050406030204" pitchFamily="18" charset="0"/>
                                     <a:ea typeface="Cambria Math" panose="02040503050406030204" pitchFamily="18" charset="0"/>
                                   </a:rPr>
                                 </m:ctrlPr>
@@ -8148,7 +8141,7 @@
                                   <m:sSubPr>
                                     <m:ctrlPr>
                                       <a:rPr lang="en-US" i="1">
-                                        <a:latin typeface="Cambria Math" charset="0"/>
+                                        <a:latin typeface="Cambria Math" panose="02040503050406030204" pitchFamily="18" charset="0"/>
                                         <a:ea typeface="Cambria Math" panose="02040503050406030204" pitchFamily="18" charset="0"/>
                                       </a:rPr>
                                     </m:ctrlPr>
@@ -8207,7 +8200,7 @@
                       <m:sSupPr>
                         <m:ctrlPr>
                           <a:rPr lang="en-US" i="1" smtClean="0">
-                            <a:latin typeface="Cambria Math" charset="0"/>
+                            <a:latin typeface="Cambria Math" panose="02040503050406030204" pitchFamily="18" charset="0"/>
                             <a:ea typeface="Cambria Math" panose="02040503050406030204" pitchFamily="18" charset="0"/>
                           </a:rPr>
                         </m:ctrlPr>
@@ -8217,7 +8210,7 @@
                           <m:sSubPr>
                             <m:ctrlPr>
                               <a:rPr lang="en-US" i="1" smtClean="0">
-                                <a:latin typeface="Cambria Math" charset="0"/>
+                                <a:latin typeface="Cambria Math" panose="02040503050406030204" pitchFamily="18" charset="0"/>
                                 <a:ea typeface="Cambria Math" panose="02040503050406030204" pitchFamily="18" charset="0"/>
                               </a:rPr>
                             </m:ctrlPr>
@@ -8289,7 +8282,7 @@
                           <m:endChr m:val="}"/>
                           <m:ctrlPr>
                             <a:rPr lang="en-US" sz="2667" i="1">
-                              <a:latin typeface="Cambria Math" charset="0"/>
+                              <a:latin typeface="Cambria Math" panose="02040503050406030204" pitchFamily="18" charset="0"/>
                             </a:rPr>
                           </m:ctrlPr>
                         </m:dPr>
@@ -8298,7 +8291,7 @@
                             <m:dPr>
                               <m:ctrlPr>
                                 <a:rPr lang="en-US" sz="2667" i="1">
-                                  <a:latin typeface="Cambria Math" charset="0"/>
+                                  <a:latin typeface="Cambria Math" panose="02040503050406030204" pitchFamily="18" charset="0"/>
                                 </a:rPr>
                               </m:ctrlPr>
                             </m:dPr>
@@ -8331,7 +8324,7 @@
                                 <m:sSupPr>
                                   <m:ctrlPr>
                                     <a:rPr lang="en-US" sz="2667" i="1">
-                                      <a:latin typeface="Cambria Math" charset="0"/>
+                                      <a:latin typeface="Cambria Math" panose="02040503050406030204" pitchFamily="18" charset="0"/>
                                     </a:rPr>
                                   </m:ctrlPr>
                                 </m:sSupPr>
@@ -8374,7 +8367,7 @@
                                 <m:sSupPr>
                                   <m:ctrlPr>
                                     <a:rPr lang="en-US" sz="2667" i="1">
-                                      <a:latin typeface="Cambria Math" charset="0"/>
+                                      <a:latin typeface="Cambria Math" panose="02040503050406030204" pitchFamily="18" charset="0"/>
                                     </a:rPr>
                                   </m:ctrlPr>
                                 </m:sSupPr>
@@ -8405,7 +8398,7 @@
                                 <m:sSupPr>
                                   <m:ctrlPr>
                                     <a:rPr lang="en-US" sz="2667" i="1">
-                                      <a:latin typeface="Cambria Math" charset="0"/>
+                                      <a:latin typeface="Cambria Math" panose="02040503050406030204" pitchFamily="18" charset="0"/>
                                     </a:rPr>
                                   </m:ctrlPr>
                                 </m:sSupPr>
@@ -8438,7 +8431,7 @@
                             <m:fPr>
                               <m:ctrlPr>
                                 <a:rPr lang="en-US" sz="2667" i="1">
-                                  <a:latin typeface="Cambria Math" charset="0"/>
+                                  <a:latin typeface="Cambria Math" panose="02040503050406030204" pitchFamily="18" charset="0"/>
                                 </a:rPr>
                               </m:ctrlPr>
                             </m:fPr>
@@ -8448,7 +8441,7 @@
                                   <m:chr m:val="̅"/>
                                   <m:ctrlPr>
                                     <a:rPr lang="en-US" sz="2667" i="1">
-                                      <a:latin typeface="Cambria Math" charset="0"/>
+                                      <a:latin typeface="Cambria Math" panose="02040503050406030204" pitchFamily="18" charset="0"/>
                                     </a:rPr>
                                   </m:ctrlPr>
                                 </m:accPr>
@@ -8481,7 +8474,7 @@
                             <m:sSupPr>
                               <m:ctrlPr>
                                 <a:rPr lang="en-US" sz="2667" i="1">
-                                  <a:latin typeface="Cambria Math" charset="0"/>
+                                  <a:latin typeface="Cambria Math" panose="02040503050406030204" pitchFamily="18" charset="0"/>
                                   <a:ea typeface="Cambria Math" panose="02040503050406030204" pitchFamily="18" charset="0"/>
                                 </a:rPr>
                               </m:ctrlPr>
@@ -8523,7 +8516,7 @@
                             <m:sSupPr>
                               <m:ctrlPr>
                                 <a:rPr lang="en-US" sz="2667" i="1">
-                                  <a:latin typeface="Cambria Math" charset="0"/>
+                                  <a:latin typeface="Cambria Math" panose="02040503050406030204" pitchFamily="18" charset="0"/>
                                   <a:ea typeface="Cambria Math" panose="02040503050406030204" pitchFamily="18" charset="0"/>
                                 </a:rPr>
                               </m:ctrlPr>
@@ -8540,7 +8533,7 @@
                                 <m:sSubPr>
                                   <m:ctrlPr>
                                     <a:rPr lang="en-US" sz="2667" i="1">
-                                      <a:latin typeface="Cambria Math" charset="0"/>
+                                      <a:latin typeface="Cambria Math" panose="02040503050406030204" pitchFamily="18" charset="0"/>
                                       <a:ea typeface="Cambria Math" panose="02040503050406030204" pitchFamily="18" charset="0"/>
                                     </a:rPr>
                                   </m:ctrlPr>
@@ -8593,7 +8586,7 @@
                             <m:sSubPr>
                               <m:ctrlPr>
                                 <a:rPr lang="en-US" sz="2667" i="1">
-                                  <a:latin typeface="Cambria Math" charset="0"/>
+                                  <a:latin typeface="Cambria Math" panose="02040503050406030204" pitchFamily="18" charset="0"/>
                                   <a:ea typeface="Cambria Math" panose="02040503050406030204" pitchFamily="18" charset="0"/>
                                 </a:rPr>
                               </m:ctrlPr>
@@ -8628,7 +8621,7 @@
                             <m:sSupPr>
                               <m:ctrlPr>
                                 <a:rPr lang="en-US" sz="2667" i="1">
-                                  <a:latin typeface="Cambria Math" charset="0"/>
+                                  <a:latin typeface="Cambria Math" panose="02040503050406030204" pitchFamily="18" charset="0"/>
                                   <a:ea typeface="Cambria Math" panose="02040503050406030204" pitchFamily="18" charset="0"/>
                                 </a:rPr>
                               </m:ctrlPr>
@@ -8670,7 +8663,7 @@
                             <m:sSubSupPr>
                               <m:ctrlPr>
                                 <a:rPr lang="en-US" sz="2667" i="1">
-                                  <a:latin typeface="Cambria Math" charset="0"/>
+                                  <a:latin typeface="Cambria Math" panose="02040503050406030204" pitchFamily="18" charset="0"/>
                                   <a:ea typeface="Cambria Math" panose="02040503050406030204" pitchFamily="18" charset="0"/>
                                 </a:rPr>
                               </m:ctrlPr>
@@ -8705,7 +8698,7 @@
                                 <m:sSupPr>
                                   <m:ctrlPr>
                                     <a:rPr lang="en-US" sz="2667" i="1">
-                                      <a:latin typeface="Cambria Math" charset="0"/>
+                                      <a:latin typeface="Cambria Math" panose="02040503050406030204" pitchFamily="18" charset="0"/>
                                       <a:ea typeface="Cambria Math" panose="02040503050406030204" pitchFamily="18" charset="0"/>
                                     </a:rPr>
                                   </m:ctrlPr>
@@ -8742,7 +8735,7 @@
                             <m:sSubSupPr>
                               <m:ctrlPr>
                                 <a:rPr lang="en-US" sz="2667" i="1">
-                                  <a:latin typeface="Cambria Math" charset="0"/>
+                                  <a:latin typeface="Cambria Math" panose="02040503050406030204" pitchFamily="18" charset="0"/>
                                   <a:ea typeface="Cambria Math" panose="02040503050406030204" pitchFamily="18" charset="0"/>
                                 </a:rPr>
                               </m:ctrlPr>
@@ -9022,10 +9015,6 @@
               <a:rPr lang="en-US" dirty="0" err="1"/>
               <a:t>ZKLang</a:t>
             </a:r>
-            <a:r>
-              <a:rPr lang="en-US" dirty="0"/>
-              <a:t/>
-            </a:r>
             <a:br>
               <a:rPr lang="en-US" dirty="0"/>
             </a:br>
@@ -9070,7 +9059,7 @@
                       <m:dPr>
                         <m:ctrlPr>
                           <a:rPr lang="en-US" b="0" i="1" smtClean="0">
-                            <a:latin typeface="Cambria Math" charset="0"/>
+                            <a:latin typeface="Cambria Math" panose="02040503050406030204" pitchFamily="18" charset="0"/>
                           </a:rPr>
                         </m:ctrlPr>
                       </m:dPr>
@@ -9123,7 +9112,7 @@
                       <m:sSupPr>
                         <m:ctrlPr>
                           <a:rPr lang="en-US" b="0" i="1" smtClean="0">
-                            <a:latin typeface="Cambria Math" charset="0"/>
+                            <a:latin typeface="Cambria Math" panose="02040503050406030204" pitchFamily="18" charset="0"/>
                           </a:rPr>
                         </m:ctrlPr>
                       </m:sSupPr>
@@ -9155,7 +9144,7 @@
                       <m:sSupPr>
                         <m:ctrlPr>
                           <a:rPr lang="en-US" b="0" i="1" smtClean="0">
-                            <a:latin typeface="Cambria Math" charset="0"/>
+                            <a:latin typeface="Cambria Math" panose="02040503050406030204" pitchFamily="18" charset="0"/>
                             <a:ea typeface="Cambria Math" panose="02040503050406030204" pitchFamily="18" charset="0"/>
                           </a:rPr>
                         </m:ctrlPr>
@@ -9192,7 +9181,7 @@
                         <m:chr m:val="̅"/>
                         <m:ctrlPr>
                           <a:rPr lang="en-US" i="1" smtClean="0">
-                            <a:latin typeface="Cambria Math" charset="0"/>
+                            <a:latin typeface="Cambria Math" panose="02040503050406030204" pitchFamily="18" charset="0"/>
                           </a:rPr>
                         </m:ctrlPr>
                       </m:accPr>
@@ -9223,7 +9212,7 @@
                       <m:sSupPr>
                         <m:ctrlPr>
                           <a:rPr lang="en-US" b="0" i="1" smtClean="0">
-                            <a:latin typeface="Cambria Math" charset="0"/>
+                            <a:latin typeface="Cambria Math" panose="02040503050406030204" pitchFamily="18" charset="0"/>
                             <a:ea typeface="Cambria Math" panose="02040503050406030204" pitchFamily="18" charset="0"/>
                           </a:rPr>
                         </m:ctrlPr>
@@ -9272,7 +9261,7 @@
                       <m:sSupPr>
                         <m:ctrlPr>
                           <a:rPr lang="en-US" b="0" i="1" smtClean="0">
-                            <a:latin typeface="Cambria Math" charset="0"/>
+                            <a:latin typeface="Cambria Math" panose="02040503050406030204" pitchFamily="18" charset="0"/>
                             <a:ea typeface="Cambria Math" panose="02040503050406030204" pitchFamily="18" charset="0"/>
                           </a:rPr>
                         </m:ctrlPr>
@@ -9282,7 +9271,7 @@
                           <m:dPr>
                             <m:ctrlPr>
                               <a:rPr lang="en-US" i="1">
-                                <a:latin typeface="Cambria Math" charset="0"/>
+                                <a:latin typeface="Cambria Math" panose="02040503050406030204" pitchFamily="18" charset="0"/>
                                 <a:ea typeface="Cambria Math" panose="02040503050406030204" pitchFamily="18" charset="0"/>
                               </a:rPr>
                             </m:ctrlPr>
@@ -9292,7 +9281,7 @@
                               <m:sSubPr>
                                 <m:ctrlPr>
                                   <a:rPr lang="en-US" i="1">
-                                    <a:latin typeface="Cambria Math" charset="0"/>
+                                    <a:latin typeface="Cambria Math" panose="02040503050406030204" pitchFamily="18" charset="0"/>
                                     <a:ea typeface="Cambria Math" panose="02040503050406030204" pitchFamily="18" charset="0"/>
                                   </a:rPr>
                                 </m:ctrlPr>
@@ -9327,7 +9316,7 @@
                               <m:sSupPr>
                                 <m:ctrlPr>
                                   <a:rPr lang="en-US" i="1">
-                                    <a:latin typeface="Cambria Math" charset="0"/>
+                                    <a:latin typeface="Cambria Math" panose="02040503050406030204" pitchFamily="18" charset="0"/>
                                     <a:ea typeface="Cambria Math" panose="02040503050406030204" pitchFamily="18" charset="0"/>
                                   </a:rPr>
                                 </m:ctrlPr>
@@ -9337,7 +9326,7 @@
                                   <m:sSubPr>
                                     <m:ctrlPr>
                                       <a:rPr lang="en-US" i="1">
-                                        <a:latin typeface="Cambria Math" charset="0"/>
+                                        <a:latin typeface="Cambria Math" panose="02040503050406030204" pitchFamily="18" charset="0"/>
                                         <a:ea typeface="Cambria Math" panose="02040503050406030204" pitchFamily="18" charset="0"/>
                                       </a:rPr>
                                     </m:ctrlPr>
@@ -9383,7 +9372,7 @@
                               <m:sSupPr>
                                 <m:ctrlPr>
                                   <a:rPr lang="en-US" i="1">
-                                    <a:latin typeface="Cambria Math" charset="0"/>
+                                    <a:latin typeface="Cambria Math" panose="02040503050406030204" pitchFamily="18" charset="0"/>
                                     <a:ea typeface="Cambria Math" panose="02040503050406030204" pitchFamily="18" charset="0"/>
                                   </a:rPr>
                                 </m:ctrlPr>
@@ -9393,7 +9382,7 @@
                                   <m:sSubPr>
                                     <m:ctrlPr>
                                       <a:rPr lang="en-US" i="1">
-                                        <a:latin typeface="Cambria Math" charset="0"/>
+                                        <a:latin typeface="Cambria Math" panose="02040503050406030204" pitchFamily="18" charset="0"/>
                                         <a:ea typeface="Cambria Math" panose="02040503050406030204" pitchFamily="18" charset="0"/>
                                       </a:rPr>
                                     </m:ctrlPr>
@@ -9452,7 +9441,7 @@
                       <m:sSupPr>
                         <m:ctrlPr>
                           <a:rPr lang="en-US" b="0" i="1" smtClean="0">
-                            <a:latin typeface="Cambria Math" charset="0"/>
+                            <a:latin typeface="Cambria Math" panose="02040503050406030204" pitchFamily="18" charset="0"/>
                             <a:ea typeface="Cambria Math" panose="02040503050406030204" pitchFamily="18" charset="0"/>
                           </a:rPr>
                         </m:ctrlPr>
@@ -9462,7 +9451,7 @@
                           <m:sSupPr>
                             <m:ctrlPr>
                               <a:rPr lang="en-US" b="0" i="1" smtClean="0">
-                                <a:latin typeface="Cambria Math" charset="0"/>
+                                <a:latin typeface="Cambria Math" panose="02040503050406030204" pitchFamily="18" charset="0"/>
                                 <a:ea typeface="Cambria Math" panose="02040503050406030204" pitchFamily="18" charset="0"/>
                               </a:rPr>
                             </m:ctrlPr>
@@ -9529,7 +9518,7 @@
                       <m:sSupPr>
                         <m:ctrlPr>
                           <a:rPr lang="en-US" i="1">
-                            <a:latin typeface="Cambria Math" charset="0"/>
+                            <a:latin typeface="Cambria Math" panose="02040503050406030204" pitchFamily="18" charset="0"/>
                             <a:ea typeface="Cambria Math" panose="02040503050406030204" pitchFamily="18" charset="0"/>
                           </a:rPr>
                         </m:ctrlPr>
@@ -9539,7 +9528,7 @@
                           <m:dPr>
                             <m:ctrlPr>
                               <a:rPr lang="en-US" i="1">
-                                <a:latin typeface="Cambria Math" charset="0"/>
+                                <a:latin typeface="Cambria Math" panose="02040503050406030204" pitchFamily="18" charset="0"/>
                                 <a:ea typeface="Cambria Math" panose="02040503050406030204" pitchFamily="18" charset="0"/>
                               </a:rPr>
                             </m:ctrlPr>
@@ -9549,7 +9538,7 @@
                               <m:sSubPr>
                                 <m:ctrlPr>
                                   <a:rPr lang="en-US" i="1">
-                                    <a:latin typeface="Cambria Math" charset="0"/>
+                                    <a:latin typeface="Cambria Math" panose="02040503050406030204" pitchFamily="18" charset="0"/>
                                     <a:ea typeface="Cambria Math" panose="02040503050406030204" pitchFamily="18" charset="0"/>
                                   </a:rPr>
                                 </m:ctrlPr>
@@ -9584,7 +9573,7 @@
                               <m:sSupPr>
                                 <m:ctrlPr>
                                   <a:rPr lang="en-US" i="1">
-                                    <a:latin typeface="Cambria Math" charset="0"/>
+                                    <a:latin typeface="Cambria Math" panose="02040503050406030204" pitchFamily="18" charset="0"/>
                                     <a:ea typeface="Cambria Math" panose="02040503050406030204" pitchFamily="18" charset="0"/>
                                   </a:rPr>
                                 </m:ctrlPr>
@@ -9594,7 +9583,7 @@
                                   <m:sSubPr>
                                     <m:ctrlPr>
                                       <a:rPr lang="en-US" i="1">
-                                        <a:latin typeface="Cambria Math" charset="0"/>
+                                        <a:latin typeface="Cambria Math" panose="02040503050406030204" pitchFamily="18" charset="0"/>
                                         <a:ea typeface="Cambria Math" panose="02040503050406030204" pitchFamily="18" charset="0"/>
                                       </a:rPr>
                                     </m:ctrlPr>
@@ -9640,7 +9629,7 @@
                               <m:sSupPr>
                                 <m:ctrlPr>
                                   <a:rPr lang="en-US" i="1">
-                                    <a:latin typeface="Cambria Math" charset="0"/>
+                                    <a:latin typeface="Cambria Math" panose="02040503050406030204" pitchFamily="18" charset="0"/>
                                     <a:ea typeface="Cambria Math" panose="02040503050406030204" pitchFamily="18" charset="0"/>
                                   </a:rPr>
                                 </m:ctrlPr>
@@ -9650,7 +9639,7 @@
                                   <m:sSubPr>
                                     <m:ctrlPr>
                                       <a:rPr lang="en-US" i="1">
-                                        <a:latin typeface="Cambria Math" charset="0"/>
+                                        <a:latin typeface="Cambria Math" panose="02040503050406030204" pitchFamily="18" charset="0"/>
                                         <a:ea typeface="Cambria Math" panose="02040503050406030204" pitchFamily="18" charset="0"/>
                                       </a:rPr>
                                     </m:ctrlPr>
@@ -9709,7 +9698,7 @@
                       <m:sSupPr>
                         <m:ctrlPr>
                           <a:rPr lang="en-US" i="1" smtClean="0">
-                            <a:latin typeface="Cambria Math" charset="0"/>
+                            <a:latin typeface="Cambria Math" panose="02040503050406030204" pitchFamily="18" charset="0"/>
                             <a:ea typeface="Cambria Math" panose="02040503050406030204" pitchFamily="18" charset="0"/>
                           </a:rPr>
                         </m:ctrlPr>
@@ -9719,7 +9708,7 @@
                           <m:sSubPr>
                             <m:ctrlPr>
                               <a:rPr lang="en-US" i="1" smtClean="0">
-                                <a:latin typeface="Cambria Math" charset="0"/>
+                                <a:latin typeface="Cambria Math" panose="02040503050406030204" pitchFamily="18" charset="0"/>
                                 <a:ea typeface="Cambria Math" panose="02040503050406030204" pitchFamily="18" charset="0"/>
                               </a:rPr>
                             </m:ctrlPr>
@@ -9791,7 +9780,7 @@
                           <m:endChr m:val="}"/>
                           <m:ctrlPr>
                             <a:rPr lang="en-US" sz="2667" i="1">
-                              <a:latin typeface="Cambria Math" charset="0"/>
+                              <a:latin typeface="Cambria Math" panose="02040503050406030204" pitchFamily="18" charset="0"/>
                             </a:rPr>
                           </m:ctrlPr>
                         </m:dPr>
@@ -9800,7 +9789,7 @@
                             <m:dPr>
                               <m:ctrlPr>
                                 <a:rPr lang="en-US" sz="2667" i="1">
-                                  <a:latin typeface="Cambria Math" charset="0"/>
+                                  <a:latin typeface="Cambria Math" panose="02040503050406030204" pitchFamily="18" charset="0"/>
                                 </a:rPr>
                               </m:ctrlPr>
                             </m:dPr>
@@ -9833,7 +9822,7 @@
                                 <m:sSupPr>
                                   <m:ctrlPr>
                                     <a:rPr lang="en-US" sz="2667" i="1">
-                                      <a:latin typeface="Cambria Math" charset="0"/>
+                                      <a:latin typeface="Cambria Math" panose="02040503050406030204" pitchFamily="18" charset="0"/>
                                     </a:rPr>
                                   </m:ctrlPr>
                                 </m:sSupPr>
@@ -9876,7 +9865,7 @@
                                 <m:sSupPr>
                                   <m:ctrlPr>
                                     <a:rPr lang="en-US" sz="2667" i="1">
-                                      <a:latin typeface="Cambria Math" charset="0"/>
+                                      <a:latin typeface="Cambria Math" panose="02040503050406030204" pitchFamily="18" charset="0"/>
                                     </a:rPr>
                                   </m:ctrlPr>
                                 </m:sSupPr>
@@ -9907,7 +9896,7 @@
                                 <m:sSupPr>
                                   <m:ctrlPr>
                                     <a:rPr lang="en-US" sz="2667" i="1">
-                                      <a:latin typeface="Cambria Math" charset="0"/>
+                                      <a:latin typeface="Cambria Math" panose="02040503050406030204" pitchFamily="18" charset="0"/>
                                     </a:rPr>
                                   </m:ctrlPr>
                                 </m:sSupPr>
@@ -9940,7 +9929,7 @@
                             <m:fPr>
                               <m:ctrlPr>
                                 <a:rPr lang="en-US" sz="2667" i="1">
-                                  <a:latin typeface="Cambria Math" charset="0"/>
+                                  <a:latin typeface="Cambria Math" panose="02040503050406030204" pitchFamily="18" charset="0"/>
                                 </a:rPr>
                               </m:ctrlPr>
                             </m:fPr>
@@ -9950,7 +9939,7 @@
                                   <m:chr m:val="̅"/>
                                   <m:ctrlPr>
                                     <a:rPr lang="en-US" sz="2667" i="1">
-                                      <a:latin typeface="Cambria Math" charset="0"/>
+                                      <a:latin typeface="Cambria Math" panose="02040503050406030204" pitchFamily="18" charset="0"/>
                                     </a:rPr>
                                   </m:ctrlPr>
                                 </m:accPr>
@@ -9983,7 +9972,7 @@
                             <m:sSupPr>
                               <m:ctrlPr>
                                 <a:rPr lang="en-US" sz="2667" i="1">
-                                  <a:latin typeface="Cambria Math" charset="0"/>
+                                  <a:latin typeface="Cambria Math" panose="02040503050406030204" pitchFamily="18" charset="0"/>
                                   <a:ea typeface="Cambria Math" panose="02040503050406030204" pitchFamily="18" charset="0"/>
                                 </a:rPr>
                               </m:ctrlPr>
@@ -10025,7 +10014,7 @@
                             <m:sSupPr>
                               <m:ctrlPr>
                                 <a:rPr lang="en-US" sz="2667" i="1">
-                                  <a:latin typeface="Cambria Math" charset="0"/>
+                                  <a:latin typeface="Cambria Math" panose="02040503050406030204" pitchFamily="18" charset="0"/>
                                   <a:ea typeface="Cambria Math" panose="02040503050406030204" pitchFamily="18" charset="0"/>
                                 </a:rPr>
                               </m:ctrlPr>
@@ -10042,7 +10031,7 @@
                                 <m:sSubPr>
                                   <m:ctrlPr>
                                     <a:rPr lang="en-US" sz="2667" i="1">
-                                      <a:latin typeface="Cambria Math" charset="0"/>
+                                      <a:latin typeface="Cambria Math" panose="02040503050406030204" pitchFamily="18" charset="0"/>
                                       <a:ea typeface="Cambria Math" panose="02040503050406030204" pitchFamily="18" charset="0"/>
                                     </a:rPr>
                                   </m:ctrlPr>
@@ -10095,7 +10084,7 @@
                             <m:sSubPr>
                               <m:ctrlPr>
                                 <a:rPr lang="en-US" sz="2667" i="1">
-                                  <a:latin typeface="Cambria Math" charset="0"/>
+                                  <a:latin typeface="Cambria Math" panose="02040503050406030204" pitchFamily="18" charset="0"/>
                                   <a:ea typeface="Cambria Math" panose="02040503050406030204" pitchFamily="18" charset="0"/>
                                 </a:rPr>
                               </m:ctrlPr>
@@ -10130,7 +10119,7 @@
                             <m:sSupPr>
                               <m:ctrlPr>
                                 <a:rPr lang="en-US" sz="2667" i="1">
-                                  <a:latin typeface="Cambria Math" charset="0"/>
+                                  <a:latin typeface="Cambria Math" panose="02040503050406030204" pitchFamily="18" charset="0"/>
                                   <a:ea typeface="Cambria Math" panose="02040503050406030204" pitchFamily="18" charset="0"/>
                                 </a:rPr>
                               </m:ctrlPr>
@@ -10172,7 +10161,7 @@
                             <m:sSubSupPr>
                               <m:ctrlPr>
                                 <a:rPr lang="en-US" sz="2667" i="1">
-                                  <a:latin typeface="Cambria Math" charset="0"/>
+                                  <a:latin typeface="Cambria Math" panose="02040503050406030204" pitchFamily="18" charset="0"/>
                                   <a:ea typeface="Cambria Math" panose="02040503050406030204" pitchFamily="18" charset="0"/>
                                 </a:rPr>
                               </m:ctrlPr>
@@ -10207,7 +10196,7 @@
                                 <m:sSupPr>
                                   <m:ctrlPr>
                                     <a:rPr lang="en-US" sz="2667" i="1">
-                                      <a:latin typeface="Cambria Math" charset="0"/>
+                                      <a:latin typeface="Cambria Math" panose="02040503050406030204" pitchFamily="18" charset="0"/>
                                       <a:ea typeface="Cambria Math" panose="02040503050406030204" pitchFamily="18" charset="0"/>
                                     </a:rPr>
                                   </m:ctrlPr>
@@ -10244,7 +10233,7 @@
                             <m:sSubSupPr>
                               <m:ctrlPr>
                                 <a:rPr lang="en-US" sz="2667" i="1">
-                                  <a:latin typeface="Cambria Math" charset="0"/>
+                                  <a:latin typeface="Cambria Math" panose="02040503050406030204" pitchFamily="18" charset="0"/>
                                   <a:ea typeface="Cambria Math" panose="02040503050406030204" pitchFamily="18" charset="0"/>
                                 </a:rPr>
                               </m:ctrlPr>

</xml_diff>

<commit_message>
small change by Jan
</commit_message>
<xml_diff>
--- a/idemix-middlelayer-spec/presentation.pptx
+++ b/idemix-middlelayer-spec/presentation.pptx
@@ -6095,8 +6095,8 @@
           </a:p>
         </p:txBody>
       </p:sp>
-      <mc:AlternateContent xmlns:mc="http://schemas.openxmlformats.org/markup-compatibility/2006" xmlns:a14="http://schemas.microsoft.com/office/drawing/2010/main">
-        <mc:Choice Requires="a14">
+      <mc:AlternateContent xmlns:mc="http://schemas.openxmlformats.org/markup-compatibility/2006">
+        <mc:Choice xmlns:a14="http://schemas.microsoft.com/office/drawing/2010/main" Requires="a14">
           <p:sp>
             <p:nvSpPr>
               <p:cNvPr id="13315" name="Rectangle 3"/>
@@ -6122,45 +6122,45 @@
                 </a:pPr>
                 <a:r>
                   <a:rPr lang="en-US" dirty="0"/>
-                  <a:t>Signature </a:t>
+                  <a:t>PoK of Signature </a:t>
                 </a:r>
                 <a14:m>
                   <m:oMath xmlns:m="http://schemas.openxmlformats.org/officeDocument/2006/math">
                     <m:d>
                       <m:dPr>
                         <m:ctrlPr>
-                          <a:rPr lang="en-US" b="0" i="1" smtClean="0">
+                          <a:rPr lang="en-US" i="1">
                             <a:latin typeface="Cambria Math" panose="02040503050406030204" pitchFamily="18" charset="0"/>
                           </a:rPr>
                         </m:ctrlPr>
                       </m:dPr>
                       <m:e>
                         <m:r>
-                          <a:rPr lang="en-US" b="0" i="1" smtClean="0">
+                          <a:rPr lang="en-US" i="1">
                             <a:latin typeface="Cambria Math" panose="02040503050406030204" pitchFamily="18" charset="0"/>
                           </a:rPr>
                           <m:t>𝐴</m:t>
                         </m:r>
                         <m:r>
-                          <a:rPr lang="en-US" b="0" i="1" smtClean="0">
+                          <a:rPr lang="en-US" i="1">
                             <a:latin typeface="Cambria Math" panose="02040503050406030204" pitchFamily="18" charset="0"/>
                           </a:rPr>
                           <m:t>, </m:t>
                         </m:r>
                         <m:r>
-                          <a:rPr lang="en-US" b="0" i="1" smtClean="0">
+                          <a:rPr lang="en-US" i="1">
                             <a:latin typeface="Cambria Math" panose="02040503050406030204" pitchFamily="18" charset="0"/>
                           </a:rPr>
                           <m:t>𝑒</m:t>
                         </m:r>
                         <m:r>
-                          <a:rPr lang="en-US" b="0" i="1" smtClean="0">
+                          <a:rPr lang="en-US" i="1">
                             <a:latin typeface="Cambria Math" panose="02040503050406030204" pitchFamily="18" charset="0"/>
                           </a:rPr>
                           <m:t>, </m:t>
                         </m:r>
                         <m:r>
-                          <a:rPr lang="en-US" b="0" i="1" smtClean="0">
+                          <a:rPr lang="en-US" i="1">
                             <a:latin typeface="Cambria Math" panose="02040503050406030204" pitchFamily="18" charset="0"/>
                           </a:rPr>
                           <m:t>𝑠</m:t>
@@ -6169,10 +6169,105 @@
                     </m:d>
                   </m:oMath>
                 </a14:m>
+                <a:r>
+                  <a:rPr lang="en-US" dirty="0"/>
+                  <a:t> on message </a:t>
+                </a:r>
+                <a14:m>
+                  <m:oMath xmlns:m="http://schemas.openxmlformats.org/officeDocument/2006/math">
+                    <m:r>
+                      <a:rPr lang="en-US" i="1">
+                        <a:latin typeface="Cambria Math" panose="02040503050406030204" pitchFamily="18" charset="0"/>
+                      </a:rPr>
+                      <m:t>𝑚</m:t>
+                    </m:r>
+                  </m:oMath>
+                </a14:m>
+                <a:r>
+                  <a:rPr lang="en-US" dirty="0"/>
+                  <a:t> </a:t>
+                </a:r>
+                <a:r>
+                  <a:rPr lang="en-US" dirty="0" err="1"/>
+                  <a:t>w.r.t</a:t>
+                </a:r>
+                <a:r>
+                  <a:rPr lang="en-US" dirty="0"/>
+                  <a:t>. issuer public key  </a:t>
+                </a:r>
+                <a14:m>
+                  <m:oMath xmlns:m="http://schemas.openxmlformats.org/officeDocument/2006/math">
+                    <m:sSup>
+                      <m:sSupPr>
+                        <m:ctrlPr>
+                          <a:rPr lang="en-US" i="1">
+                            <a:latin typeface="Cambria Math" panose="02040503050406030204" pitchFamily="18" charset="0"/>
+                            <a:ea typeface="Cambria Math" panose="02040503050406030204" pitchFamily="18" charset="0"/>
+                          </a:rPr>
+                        </m:ctrlPr>
+                      </m:sSupPr>
+                      <m:e>
+                        <m:sSup>
+                          <m:sSupPr>
+                            <m:ctrlPr>
+                              <a:rPr lang="en-US" i="1">
+                                <a:latin typeface="Cambria Math" panose="02040503050406030204" pitchFamily="18" charset="0"/>
+                                <a:ea typeface="Cambria Math" panose="02040503050406030204" pitchFamily="18" charset="0"/>
+                              </a:rPr>
+                            </m:ctrlPr>
+                          </m:sSupPr>
+                          <m:e>
+                            <m:r>
+                              <a:rPr lang="en-US" i="1">
+                                <a:latin typeface="Cambria Math" charset="0"/>
+                                <a:ea typeface="Cambria Math" panose="02040503050406030204" pitchFamily="18" charset="0"/>
+                              </a:rPr>
+                              <m:t>𝑦</m:t>
+                            </m:r>
+                            <m:r>
+                              <a:rPr lang="en-US" i="1">
+                                <a:latin typeface="Cambria Math" charset="0"/>
+                                <a:ea typeface="Cambria Math" panose="02040503050406030204" pitchFamily="18" charset="0"/>
+                              </a:rPr>
+                              <m:t>=</m:t>
+                            </m:r>
+                            <m:r>
+                              <a:rPr lang="en-US" i="1">
+                                <a:latin typeface="Cambria Math" charset="0"/>
+                                <a:ea typeface="Cambria Math" panose="02040503050406030204" pitchFamily="18" charset="0"/>
+                              </a:rPr>
+                              <m:t>𝑔</m:t>
+                            </m:r>
+                          </m:e>
+                          <m:sup>
+                            <m:r>
+                              <a:rPr lang="en-US" i="1">
+                                <a:latin typeface="Cambria Math" panose="02040503050406030204" pitchFamily="18" charset="0"/>
+                                <a:ea typeface="Cambria Math" panose="02040503050406030204" pitchFamily="18" charset="0"/>
+                              </a:rPr>
+                              <m:t>′</m:t>
+                            </m:r>
+                          </m:sup>
+                        </m:sSup>
+                      </m:e>
+                      <m:sup>
+                        <m:r>
+                          <a:rPr lang="en-US" i="1">
+                            <a:latin typeface="Cambria Math" panose="02040503050406030204" pitchFamily="18" charset="0"/>
+                            <a:ea typeface="Cambria Math" panose="02040503050406030204" pitchFamily="18" charset="0"/>
+                          </a:rPr>
+                          <m:t>𝑥</m:t>
+                        </m:r>
+                      </m:sup>
+                    </m:sSup>
+                  </m:oMath>
+                </a14:m>
                 <a:endParaRPr lang="en-US" b="0" dirty="0"/>
               </a:p>
               <a:p>
-                <a:pPr lvl="1"/>
+                <a:pPr marL="461398" lvl="1" indent="0">
+                  <a:buNone/>
+                </a:pPr>
                 <a:endParaRPr lang="en-US" b="0" dirty="0"/>
               </a:p>
               <a:p>
@@ -7366,7 +7461,7 @@
             </p:txBody>
           </p:sp>
         </mc:Choice>
-        <mc:Fallback xmlns="">
+        <mc:Fallback>
           <p:sp>
             <p:nvSpPr>
               <p:cNvPr id="13315" name="Rectangle 3"/>
@@ -7385,7 +7480,7 @@
               <a:blipFill>
                 <a:blip r:embed="rId3"/>
                 <a:stretch>
-                  <a:fillRect t="-2310"/>
+                  <a:fillRect t="-1815"/>
                 </a:stretch>
               </a:blipFill>
             </p:spPr>

</xml_diff>